<commit_message>
Group 4 - Final Presentation (Term Project).pptx
</commit_message>
<xml_diff>
--- a/Phase (6) - Finalization & Presentation/Presentation/Group 4 - Final Presentation (Term Project).pptx
+++ b/Phase (6) - Finalization & Presentation/Presentation/Group 4 - Final Presentation (Term Project).pptx
@@ -3995,24 +3995,24 @@
               <a:t> Project </a:t>
             </a:r>
             <a:br>
+              <a:rPr lang="tr-TR" b="1">
+                <a:latin typeface="Arial" panose="020B0604020202020204" pitchFamily="34" charset="0"/>
+                <a:cs typeface="Arial" panose="020B0604020202020204" pitchFamily="34" charset="0"/>
+              </a:rPr>
+            </a:br>
+            <a:r>
+              <a:rPr lang="tr-TR" b="1">
+                <a:latin typeface="Arial" panose="020B0604020202020204" pitchFamily="34" charset="0"/>
+                <a:cs typeface="Arial" panose="020B0604020202020204" pitchFamily="34" charset="0"/>
+              </a:rPr>
+              <a:t>Final </a:t>
+            </a:r>
+            <a:r>
               <a:rPr lang="tr-TR" b="1" dirty="0">
                 <a:latin typeface="Arial" panose="020B0604020202020204" pitchFamily="34" charset="0"/>
                 <a:cs typeface="Arial" panose="020B0604020202020204" pitchFamily="34" charset="0"/>
               </a:rPr>
-            </a:br>
-            <a:r>
-              <a:rPr lang="tr-TR" b="1" dirty="0" err="1">
-                <a:latin typeface="Arial" panose="020B0604020202020204" pitchFamily="34" charset="0"/>
-                <a:cs typeface="Arial" panose="020B0604020202020204" pitchFamily="34" charset="0"/>
-              </a:rPr>
-              <a:t>Progress</a:t>
-            </a:r>
-            <a:r>
-              <a:rPr lang="tr-TR" b="1" dirty="0">
-                <a:latin typeface="Arial" panose="020B0604020202020204" pitchFamily="34" charset="0"/>
-                <a:cs typeface="Arial" panose="020B0604020202020204" pitchFamily="34" charset="0"/>
-              </a:rPr>
-              <a:t> Presentation</a:t>
+              <a:t>Presentation</a:t>
             </a:r>
           </a:p>
         </p:txBody>

</xml_diff>